<commit_message>
Update Should Chevy Go Retro.pptx
</commit_message>
<xml_diff>
--- a/Should Chevy Go Retro.pptx
+++ b/Should Chevy Go Retro.pptx
@@ -20,20 +20,21 @@
     <p:sldId id="265" r:id="rId15"/>
     <p:sldId id="266" r:id="rId16"/>
     <p:sldId id="267" r:id="rId17"/>
+    <p:sldId id="268" r:id="rId18"/>
   </p:sldIdLst>
   <p:sldSz cy="5143500" cx="9144000"/>
   <p:notesSz cx="6858000" cy="9144000"/>
   <p:embeddedFontLst>
     <p:embeddedFont>
       <p:font typeface="Proxima Nova"/>
-      <p:regular r:id="rId18"/>
-      <p:bold r:id="rId19"/>
-      <p:italic r:id="rId20"/>
-      <p:boldItalic r:id="rId21"/>
+      <p:regular r:id="rId19"/>
+      <p:bold r:id="rId20"/>
+      <p:italic r:id="rId21"/>
+      <p:boldItalic r:id="rId22"/>
     </p:embeddedFont>
     <p:embeddedFont>
       <p:font typeface="Alfa Slab One"/>
-      <p:regular r:id="rId22"/>
+      <p:regular r:id="rId23"/>
     </p:embeddedFont>
   </p:embeddedFontLst>
   <p:defaultTextStyle>
@@ -828,7 +829,7 @@
       </p:grpSpPr>
       <p:sp>
         <p:nvSpPr>
-          <p:cNvPr id="109" name="Google Shape;109;g19aaa3fbb64_0_293:notes"/>
+          <p:cNvPr id="109" name="Google Shape;109;g1a1b39cb9c5_0_75:notes"/>
           <p:cNvSpPr/>
           <p:nvPr>
             <p:ph idx="2" type="sldImg"/>
@@ -863,7 +864,7 @@
       </p:sp>
       <p:sp>
         <p:nvSpPr>
-          <p:cNvPr id="110" name="Google Shape;110;g19aaa3fbb64_0_293:notes"/>
+          <p:cNvPr id="110" name="Google Shape;110;g1a1b39cb9c5_0_75:notes"/>
           <p:cNvSpPr txBox="1"/>
           <p:nvPr>
             <p:ph idx="1" type="body"/>
@@ -913,7 +914,7 @@
   <p:cSld>
     <p:spTree>
       <p:nvGrpSpPr>
-        <p:cNvPr id="113" name="Shape 113"/>
+        <p:cNvPr id="114" name="Shape 114"/>
         <p:cNvGrpSpPr/>
         <p:nvPr/>
       </p:nvGrpSpPr>
@@ -927,7 +928,7 @@
       </p:grpSpPr>
       <p:sp>
         <p:nvSpPr>
-          <p:cNvPr id="114" name="Google Shape;114;g19aaa3fbb64_0_297:notes"/>
+          <p:cNvPr id="115" name="Google Shape;115;g19aaa3fbb64_0_293:notes"/>
           <p:cNvSpPr/>
           <p:nvPr>
             <p:ph idx="2" type="sldImg"/>
@@ -962,7 +963,7 @@
       </p:sp>
       <p:sp>
         <p:nvSpPr>
-          <p:cNvPr id="115" name="Google Shape;115;g19aaa3fbb64_0_297:notes"/>
+          <p:cNvPr id="116" name="Google Shape;116;g19aaa3fbb64_0_293:notes"/>
           <p:cNvSpPr txBox="1"/>
           <p:nvPr>
             <p:ph idx="1" type="body"/>
@@ -1026,7 +1027,7 @@
       </p:grpSpPr>
       <p:sp>
         <p:nvSpPr>
-          <p:cNvPr id="120" name="Google Shape;120;g19aaa3fbb64_0_302:notes"/>
+          <p:cNvPr id="120" name="Google Shape;120;g19aaa3fbb64_0_297:notes"/>
           <p:cNvSpPr/>
           <p:nvPr>
             <p:ph idx="2" type="sldImg"/>
@@ -1061,7 +1062,106 @@
       </p:sp>
       <p:sp>
         <p:nvSpPr>
-          <p:cNvPr id="121" name="Google Shape;121;g19aaa3fbb64_0_302:notes"/>
+          <p:cNvPr id="121" name="Google Shape;121;g19aaa3fbb64_0_297:notes"/>
+          <p:cNvSpPr txBox="1"/>
+          <p:nvPr>
+            <p:ph idx="1" type="body"/>
+          </p:nvPr>
+        </p:nvSpPr>
+        <p:spPr>
+          <a:xfrm>
+            <a:off x="685800" y="4343400"/>
+            <a:ext cx="5486400" cy="4114800"/>
+          </a:xfrm>
+          <a:prstGeom prst="rect">
+            <a:avLst/>
+          </a:prstGeom>
+        </p:spPr>
+        <p:txBody>
+          <a:bodyPr anchorCtr="0" anchor="t" bIns="91425" lIns="91425" spcFirstLastPara="1" rIns="91425" wrap="square" tIns="91425">
+            <a:noAutofit/>
+          </a:bodyPr>
+          <a:lstStyle/>
+          <a:p>
+            <a:pPr indent="0" lvl="0" marL="0" rtl="0" algn="l">
+              <a:spcBef>
+                <a:spcPts val="0"/>
+              </a:spcBef>
+              <a:spcAft>
+                <a:spcPts val="0"/>
+              </a:spcAft>
+              <a:buNone/>
+            </a:pPr>
+            <a:r>
+              <a:t/>
+            </a:r>
+            <a:endParaRPr/>
+          </a:p>
+        </p:txBody>
+      </p:sp>
+    </p:spTree>
+  </p:cSld>
+  <p:clrMapOvr>
+    <a:masterClrMapping/>
+  </p:clrMapOvr>
+</p:notes>
+</file>
+
+<file path=ppt/notesSlides/notesSlide13.xml><?xml version="1.0" encoding="utf-8"?>
+<p:notes xmlns:a="http://schemas.openxmlformats.org/drawingml/2006/main" xmlns:r="http://schemas.openxmlformats.org/officeDocument/2006/relationships" xmlns:mc="http://schemas.openxmlformats.org/markup-compatibility/2006" xmlns:mv="urn:schemas-microsoft-com:mac:vml" xmlns:p="http://schemas.openxmlformats.org/presentationml/2006/main" xmlns:c="http://schemas.openxmlformats.org/drawingml/2006/chart" xmlns:dgm="http://schemas.openxmlformats.org/drawingml/2006/diagram" xmlns:o="urn:schemas-microsoft-com:office:office" xmlns:v="urn:schemas-microsoft-com:vml" xmlns:pvml="urn:schemas-microsoft-com:office:powerpoint" xmlns:com="http://schemas.openxmlformats.org/drawingml/2006/compatibility" xmlns:p14="http://schemas.microsoft.com/office/powerpoint/2010/main" xmlns:p15="http://schemas.microsoft.com/office/powerpoint/2012/main" xmlns:ahyp="http://schemas.microsoft.com/office/drawing/2018/hyperlinkcolor" showMasterPhAnim="0" showMasterSp="0">
+  <p:cSld>
+    <p:spTree>
+      <p:nvGrpSpPr>
+        <p:cNvPr id="125" name="Shape 125"/>
+        <p:cNvGrpSpPr/>
+        <p:nvPr/>
+      </p:nvGrpSpPr>
+      <p:grpSpPr>
+        <a:xfrm>
+          <a:off x="0" y="0"/>
+          <a:ext cx="0" cy="0"/>
+          <a:chOff x="0" y="0"/>
+          <a:chExt cx="0" cy="0"/>
+        </a:xfrm>
+      </p:grpSpPr>
+      <p:sp>
+        <p:nvSpPr>
+          <p:cNvPr id="126" name="Google Shape;126;g19aaa3fbb64_0_302:notes"/>
+          <p:cNvSpPr/>
+          <p:nvPr>
+            <p:ph idx="2" type="sldImg"/>
+          </p:nvPr>
+        </p:nvSpPr>
+        <p:spPr>
+          <a:xfrm>
+            <a:off x="381300" y="685800"/>
+            <a:ext cx="6096000" cy="3429000"/>
+          </a:xfrm>
+          <a:custGeom>
+            <a:rect b="b" l="l" r="r" t="t"/>
+            <a:pathLst>
+              <a:path extrusionOk="0" h="120000" w="120000">
+                <a:moveTo>
+                  <a:pt x="0" y="0"/>
+                </a:moveTo>
+                <a:lnTo>
+                  <a:pt x="120000" y="0"/>
+                </a:lnTo>
+                <a:lnTo>
+                  <a:pt x="120000" y="120000"/>
+                </a:lnTo>
+                <a:lnTo>
+                  <a:pt x="0" y="120000"/>
+                </a:lnTo>
+                <a:close/>
+              </a:path>
+            </a:pathLst>
+          </a:custGeom>
+        </p:spPr>
+      </p:sp>
+      <p:sp>
+        <p:nvSpPr>
+          <p:cNvPr id="127" name="Google Shape;127;g19aaa3fbb64_0_302:notes"/>
           <p:cNvSpPr txBox="1"/>
           <p:nvPr>
             <p:ph idx="1" type="body"/>
@@ -1620,7 +1720,7 @@
       </p:grpSpPr>
       <p:sp>
         <p:nvSpPr>
-          <p:cNvPr id="89" name="Google Shape;89;g1a1b39cb9c5_0_63:notes"/>
+          <p:cNvPr id="89" name="Google Shape;89;g1a1e1b981dc_0_0:notes"/>
           <p:cNvSpPr/>
           <p:nvPr>
             <p:ph idx="2" type="sldImg"/>
@@ -1655,7 +1755,7 @@
       </p:sp>
       <p:sp>
         <p:nvSpPr>
-          <p:cNvPr id="90" name="Google Shape;90;g1a1b39cb9c5_0_63:notes"/>
+          <p:cNvPr id="90" name="Google Shape;90;g1a1e1b981dc_0_0:notes"/>
           <p:cNvSpPr txBox="1"/>
           <p:nvPr>
             <p:ph idx="1" type="body"/>
@@ -1705,7 +1805,7 @@
   <p:cSld>
     <p:spTree>
       <p:nvGrpSpPr>
-        <p:cNvPr id="95" name="Shape 95"/>
+        <p:cNvPr id="94" name="Shape 94"/>
         <p:cNvGrpSpPr/>
         <p:nvPr/>
       </p:nvGrpSpPr>
@@ -1719,7 +1819,7 @@
       </p:grpSpPr>
       <p:sp>
         <p:nvSpPr>
-          <p:cNvPr id="96" name="Google Shape;96;g1a1b39cb9c5_0_51:notes"/>
+          <p:cNvPr id="95" name="Google Shape;95;g1a1b39cb9c5_0_63:notes"/>
           <p:cNvSpPr/>
           <p:nvPr>
             <p:ph idx="2" type="sldImg"/>
@@ -1754,7 +1854,7 @@
       </p:sp>
       <p:sp>
         <p:nvSpPr>
-          <p:cNvPr id="97" name="Google Shape;97;g1a1b39cb9c5_0_51:notes"/>
+          <p:cNvPr id="96" name="Google Shape;96;g1a1b39cb9c5_0_63:notes"/>
           <p:cNvSpPr txBox="1"/>
           <p:nvPr>
             <p:ph idx="1" type="body"/>
@@ -1804,7 +1904,7 @@
   <p:cSld>
     <p:spTree>
       <p:nvGrpSpPr>
-        <p:cNvPr id="102" name="Shape 102"/>
+        <p:cNvPr id="101" name="Shape 101"/>
         <p:cNvGrpSpPr/>
         <p:nvPr/>
       </p:nvGrpSpPr>
@@ -1818,7 +1918,7 @@
       </p:grpSpPr>
       <p:sp>
         <p:nvSpPr>
-          <p:cNvPr id="103" name="Google Shape;103;g1a1b39cb9c5_0_75:notes"/>
+          <p:cNvPr id="102" name="Google Shape;102;g1a1b39cb9c5_0_51:notes"/>
           <p:cNvSpPr/>
           <p:nvPr>
             <p:ph idx="2" type="sldImg"/>
@@ -1853,7 +1953,7 @@
       </p:sp>
       <p:sp>
         <p:nvSpPr>
-          <p:cNvPr id="104" name="Google Shape;104;g1a1b39cb9c5_0_75:notes"/>
+          <p:cNvPr id="103" name="Google Shape;103;g1a1b39cb9c5_0_51:notes"/>
           <p:cNvSpPr txBox="1"/>
           <p:nvPr>
             <p:ph idx="1" type="body"/>
@@ -7243,6 +7343,99 @@
         </p:nvSpPr>
         <p:spPr>
           <a:xfrm>
+            <a:off x="311700" y="3487050"/>
+            <a:ext cx="8114400" cy="1439400"/>
+          </a:xfrm>
+          <a:prstGeom prst="rect">
+            <a:avLst/>
+          </a:prstGeom>
+        </p:spPr>
+        <p:txBody>
+          <a:bodyPr anchorCtr="0" anchor="b" bIns="91425" lIns="91425" spcFirstLastPara="1" rIns="91425" wrap="square" tIns="91425">
+            <a:normAutofit/>
+          </a:bodyPr>
+          <a:lstStyle/>
+          <a:p>
+            <a:pPr indent="0" lvl="0" marL="0" rtl="0" algn="ctr">
+              <a:spcBef>
+                <a:spcPts val="0"/>
+              </a:spcBef>
+              <a:spcAft>
+                <a:spcPts val="0"/>
+              </a:spcAft>
+              <a:buNone/>
+            </a:pPr>
+            <a:r>
+              <a:rPr lang="en" sz="4000"/>
+              <a:t>Weight v. Acceleration</a:t>
+            </a:r>
+            <a:endParaRPr sz="4000"/>
+          </a:p>
+        </p:txBody>
+      </p:sp>
+      <p:pic>
+        <p:nvPicPr>
+          <p:cNvPr id="113" name="Google Shape;113;p22"/>
+          <p:cNvPicPr preferRelativeResize="0"/>
+          <p:nvPr/>
+        </p:nvPicPr>
+        <p:blipFill>
+          <a:blip r:embed="rId3">
+            <a:alphaModFix/>
+          </a:blip>
+          <a:stretch>
+            <a:fillRect/>
+          </a:stretch>
+        </p:blipFill>
+        <p:spPr>
+          <a:xfrm>
+            <a:off x="1463750" y="304800"/>
+            <a:ext cx="6216489" cy="3182250"/>
+          </a:xfrm>
+          <a:prstGeom prst="rect">
+            <a:avLst/>
+          </a:prstGeom>
+          <a:noFill/>
+          <a:ln>
+            <a:noFill/>
+          </a:ln>
+        </p:spPr>
+      </p:pic>
+    </p:spTree>
+  </p:cSld>
+  <p:clrMapOvr>
+    <a:masterClrMapping/>
+  </p:clrMapOvr>
+</p:sld>
+</file>
+
+<file path=ppt/slides/slide11.xml><?xml version="1.0" encoding="utf-8"?>
+<p:sld xmlns:a="http://schemas.openxmlformats.org/drawingml/2006/main" xmlns:r="http://schemas.openxmlformats.org/officeDocument/2006/relationships" xmlns:mc="http://schemas.openxmlformats.org/markup-compatibility/2006" xmlns:mv="urn:schemas-microsoft-com:mac:vml" xmlns:p="http://schemas.openxmlformats.org/presentationml/2006/main" xmlns:c="http://schemas.openxmlformats.org/drawingml/2006/chart" xmlns:dgm="http://schemas.openxmlformats.org/drawingml/2006/diagram" xmlns:o="urn:schemas-microsoft-com:office:office" xmlns:v="urn:schemas-microsoft-com:vml" xmlns:pvml="urn:schemas-microsoft-com:office:powerpoint" xmlns:com="http://schemas.openxmlformats.org/drawingml/2006/compatibility" xmlns:p14="http://schemas.microsoft.com/office/powerpoint/2010/main" xmlns:p15="http://schemas.microsoft.com/office/powerpoint/2012/main" xmlns:ahyp="http://schemas.microsoft.com/office/drawing/2018/hyperlinkcolor">
+  <p:cSld>
+    <p:spTree>
+      <p:nvGrpSpPr>
+        <p:cNvPr id="117" name="Shape 117"/>
+        <p:cNvGrpSpPr/>
+        <p:nvPr/>
+      </p:nvGrpSpPr>
+      <p:grpSpPr>
+        <a:xfrm>
+          <a:off x="0" y="0"/>
+          <a:ext cx="0" cy="0"/>
+          <a:chOff x="0" y="0"/>
+          <a:chExt cx="0" cy="0"/>
+        </a:xfrm>
+      </p:grpSpPr>
+      <p:sp>
+        <p:nvSpPr>
+          <p:cNvPr id="118" name="Google Shape;118;p23"/>
+          <p:cNvSpPr txBox="1"/>
+          <p:nvPr>
+            <p:ph type="title"/>
+          </p:nvPr>
+        </p:nvSpPr>
+        <p:spPr>
+          <a:xfrm>
             <a:off x="311700" y="2480550"/>
             <a:ext cx="8114400" cy="2445900"/>
           </a:xfrm>
@@ -7268,178 +7461,6 @@
             <a:r>
               <a:rPr lang="en"/>
               <a:t>Data Interpretation</a:t>
-            </a:r>
-            <a:endParaRPr/>
-          </a:p>
-        </p:txBody>
-      </p:sp>
-    </p:spTree>
-  </p:cSld>
-  <p:clrMapOvr>
-    <a:masterClrMapping/>
-  </p:clrMapOvr>
-</p:sld>
-</file>
-
-<file path=ppt/slides/slide11.xml><?xml version="1.0" encoding="utf-8"?>
-<p:sld xmlns:a="http://schemas.openxmlformats.org/drawingml/2006/main" xmlns:r="http://schemas.openxmlformats.org/officeDocument/2006/relationships" xmlns:mc="http://schemas.openxmlformats.org/markup-compatibility/2006" xmlns:mv="urn:schemas-microsoft-com:mac:vml" xmlns:p="http://schemas.openxmlformats.org/presentationml/2006/main" xmlns:c="http://schemas.openxmlformats.org/drawingml/2006/chart" xmlns:dgm="http://schemas.openxmlformats.org/drawingml/2006/diagram" xmlns:o="urn:schemas-microsoft-com:office:office" xmlns:v="urn:schemas-microsoft-com:vml" xmlns:pvml="urn:schemas-microsoft-com:office:powerpoint" xmlns:com="http://schemas.openxmlformats.org/drawingml/2006/compatibility" xmlns:p14="http://schemas.microsoft.com/office/powerpoint/2010/main" xmlns:p15="http://schemas.microsoft.com/office/powerpoint/2012/main" xmlns:ahyp="http://schemas.microsoft.com/office/drawing/2018/hyperlinkcolor">
-  <p:cSld>
-    <p:spTree>
-      <p:nvGrpSpPr>
-        <p:cNvPr id="116" name="Shape 116"/>
-        <p:cNvGrpSpPr/>
-        <p:nvPr/>
-      </p:nvGrpSpPr>
-      <p:grpSpPr>
-        <a:xfrm>
-          <a:off x="0" y="0"/>
-          <a:ext cx="0" cy="0"/>
-          <a:chOff x="0" y="0"/>
-          <a:chExt cx="0" cy="0"/>
-        </a:xfrm>
-      </p:grpSpPr>
-      <p:sp>
-        <p:nvSpPr>
-          <p:cNvPr id="117" name="Google Shape;117;p23"/>
-          <p:cNvSpPr txBox="1"/>
-          <p:nvPr>
-            <p:ph type="title"/>
-          </p:nvPr>
-        </p:nvSpPr>
-        <p:spPr>
-          <a:xfrm>
-            <a:off x="311700" y="445025"/>
-            <a:ext cx="8520600" cy="572700"/>
-          </a:xfrm>
-          <a:prstGeom prst="rect">
-            <a:avLst/>
-          </a:prstGeom>
-        </p:spPr>
-        <p:txBody>
-          <a:bodyPr anchorCtr="0" anchor="t" bIns="91425" lIns="91425" spcFirstLastPara="1" rIns="91425" wrap="square" tIns="91425">
-            <a:normAutofit fontScale="90000"/>
-          </a:bodyPr>
-          <a:lstStyle/>
-          <a:p>
-            <a:pPr indent="0" lvl="0" marL="0" rtl="0" algn="l">
-              <a:spcBef>
-                <a:spcPts val="0"/>
-              </a:spcBef>
-              <a:spcAft>
-                <a:spcPts val="0"/>
-              </a:spcAft>
-              <a:buNone/>
-            </a:pPr>
-            <a:r>
-              <a:rPr lang="en"/>
-              <a:t>Recommendations</a:t>
-            </a:r>
-            <a:endParaRPr/>
-          </a:p>
-        </p:txBody>
-      </p:sp>
-      <p:sp>
-        <p:nvSpPr>
-          <p:cNvPr id="118" name="Google Shape;118;p23"/>
-          <p:cNvSpPr txBox="1"/>
-          <p:nvPr>
-            <p:ph idx="1" type="body"/>
-          </p:nvPr>
-        </p:nvSpPr>
-        <p:spPr>
-          <a:xfrm>
-            <a:off x="311700" y="1152475"/>
-            <a:ext cx="8520600" cy="3416400"/>
-          </a:xfrm>
-          <a:prstGeom prst="rect">
-            <a:avLst/>
-          </a:prstGeom>
-        </p:spPr>
-        <p:txBody>
-          <a:bodyPr anchorCtr="0" anchor="t" bIns="91425" lIns="91425" spcFirstLastPara="1" rIns="91425" wrap="square" tIns="91425">
-            <a:normAutofit/>
-          </a:bodyPr>
-          <a:lstStyle/>
-          <a:p>
-            <a:pPr indent="-342900" lvl="0" marL="457200" rtl="0" algn="l">
-              <a:spcBef>
-                <a:spcPts val="0"/>
-              </a:spcBef>
-              <a:spcAft>
-                <a:spcPts val="0"/>
-              </a:spcAft>
-              <a:buSzPts val="1800"/>
-              <a:buChar char="●"/>
-            </a:pPr>
-            <a:r>
-              <a:rPr lang="en"/>
-              <a:t>To make a good run of vintage cars, we should look into the years between 1978 to 1982.</a:t>
-            </a:r>
-            <a:endParaRPr/>
-          </a:p>
-          <a:p>
-            <a:pPr indent="-342900" lvl="0" marL="457200" rtl="0" algn="l">
-              <a:spcBef>
-                <a:spcPts val="0"/>
-              </a:spcBef>
-              <a:spcAft>
-                <a:spcPts val="0"/>
-              </a:spcAft>
-              <a:buSzPts val="1800"/>
-              <a:buChar char="●"/>
-            </a:pPr>
-            <a:r>
-              <a:rPr lang="en"/>
-              <a:t> The top </a:t>
-            </a:r>
-            <a:r>
-              <a:rPr lang="en"/>
-              <a:t>performing</a:t>
-            </a:r>
-            <a:r>
-              <a:rPr lang="en"/>
-              <a:t> cars across multiple categories were the Dodge Charger 2.2 from 1982 for MPG by weight, the 1980 Mazda GLC </a:t>
-            </a:r>
-            <a:r>
-              <a:rPr lang="en"/>
-              <a:t>performing</a:t>
-            </a:r>
-            <a:r>
-              <a:rPr lang="en"/>
-              <a:t> top of multiple categories, and the Volkswagen Rabbit, with multiple versions, also </a:t>
-            </a:r>
-            <a:r>
-              <a:rPr lang="en"/>
-              <a:t>coming</a:t>
-            </a:r>
-            <a:r>
-              <a:rPr lang="en"/>
-              <a:t> in as a pack leader across many years.</a:t>
-            </a:r>
-            <a:endParaRPr/>
-          </a:p>
-          <a:p>
-            <a:pPr indent="-342900" lvl="0" marL="457200" rtl="0" algn="l">
-              <a:spcBef>
-                <a:spcPts val="0"/>
-              </a:spcBef>
-              <a:spcAft>
-                <a:spcPts val="0"/>
-              </a:spcAft>
-              <a:buSzPts val="1800"/>
-              <a:buChar char="●"/>
-            </a:pPr>
-            <a:r>
-              <a:rPr lang="en"/>
-              <a:t>The </a:t>
-            </a:r>
-            <a:r>
-              <a:rPr lang="en"/>
-              <a:t>general</a:t>
-            </a:r>
-            <a:r>
-              <a:rPr lang="en"/>
-              <a:t> consensus is that the ideal weight and build for a vehicle comes in at around 2500-3500 lbs, giving an average MPG of around 25-32 per gallon, and an acceleration around 12-16.</a:t>
             </a:r>
             <a:endParaRPr/>
           </a:p>
@@ -7504,6 +7525,195 @@
             </a:pPr>
             <a:r>
               <a:rPr lang="en"/>
+              <a:t>Recommendations</a:t>
+            </a:r>
+            <a:endParaRPr/>
+          </a:p>
+        </p:txBody>
+      </p:sp>
+      <p:sp>
+        <p:nvSpPr>
+          <p:cNvPr id="124" name="Google Shape;124;p24"/>
+          <p:cNvSpPr txBox="1"/>
+          <p:nvPr>
+            <p:ph idx="1" type="body"/>
+          </p:nvPr>
+        </p:nvSpPr>
+        <p:spPr>
+          <a:xfrm>
+            <a:off x="311700" y="1152475"/>
+            <a:ext cx="8520600" cy="3416400"/>
+          </a:xfrm>
+          <a:prstGeom prst="rect">
+            <a:avLst/>
+          </a:prstGeom>
+        </p:spPr>
+        <p:txBody>
+          <a:bodyPr anchorCtr="0" anchor="t" bIns="91425" lIns="91425" spcFirstLastPara="1" rIns="91425" wrap="square" tIns="91425">
+            <a:normAutofit lnSpcReduction="10000"/>
+          </a:bodyPr>
+          <a:lstStyle/>
+          <a:p>
+            <a:pPr indent="-342900" lvl="0" marL="457200" rtl="0" algn="l">
+              <a:spcBef>
+                <a:spcPts val="0"/>
+              </a:spcBef>
+              <a:spcAft>
+                <a:spcPts val="0"/>
+              </a:spcAft>
+              <a:buSzPts val="1800"/>
+              <a:buChar char="●"/>
+            </a:pPr>
+            <a:r>
+              <a:rPr lang="en"/>
+              <a:t>To make a good run of vintage cars, we should look into the years between 1978 to 1982.</a:t>
+            </a:r>
+            <a:endParaRPr/>
+          </a:p>
+          <a:p>
+            <a:pPr indent="-342900" lvl="0" marL="457200" rtl="0" algn="l">
+              <a:spcBef>
+                <a:spcPts val="0"/>
+              </a:spcBef>
+              <a:spcAft>
+                <a:spcPts val="0"/>
+              </a:spcAft>
+              <a:buSzPts val="1800"/>
+              <a:buChar char="●"/>
+            </a:pPr>
+            <a:r>
+              <a:rPr lang="en"/>
+              <a:t> The top </a:t>
+            </a:r>
+            <a:r>
+              <a:rPr lang="en"/>
+              <a:t>performing</a:t>
+            </a:r>
+            <a:r>
+              <a:rPr lang="en"/>
+              <a:t> cars across multiple categories were the Dodge Charger 2.2 from 1982 for MPG by weight, the 1980 Mazda GLC </a:t>
+            </a:r>
+            <a:r>
+              <a:rPr lang="en"/>
+              <a:t>performing</a:t>
+            </a:r>
+            <a:r>
+              <a:rPr lang="en"/>
+              <a:t> top of multiple categories, and the Volkswagen Rabbit, with multiple versions, also </a:t>
+            </a:r>
+            <a:r>
+              <a:rPr lang="en"/>
+              <a:t>coming</a:t>
+            </a:r>
+            <a:r>
+              <a:rPr lang="en"/>
+              <a:t> in as a pack leader across many years.</a:t>
+            </a:r>
+            <a:endParaRPr/>
+          </a:p>
+          <a:p>
+            <a:pPr indent="-342900" lvl="0" marL="457200" rtl="0" algn="l">
+              <a:spcBef>
+                <a:spcPts val="0"/>
+              </a:spcBef>
+              <a:spcAft>
+                <a:spcPts val="0"/>
+              </a:spcAft>
+              <a:buSzPts val="1800"/>
+              <a:buChar char="●"/>
+            </a:pPr>
+            <a:r>
+              <a:rPr lang="en"/>
+              <a:t>The </a:t>
+            </a:r>
+            <a:r>
+              <a:rPr lang="en"/>
+              <a:t>general</a:t>
+            </a:r>
+            <a:r>
+              <a:rPr lang="en"/>
+              <a:t> consensus is that the ideal weight and build for a vehicle comes in at around 2500-3500 lbs, giving an average MPG of around 25-32 per gallon, and an acceleration around 12-16.</a:t>
+            </a:r>
+            <a:endParaRPr/>
+          </a:p>
+          <a:p>
+            <a:pPr indent="-342900" lvl="0" marL="457200" rtl="0" algn="l">
+              <a:spcBef>
+                <a:spcPts val="0"/>
+              </a:spcBef>
+              <a:spcAft>
+                <a:spcPts val="0"/>
+              </a:spcAft>
+              <a:buSzPts val="1800"/>
+              <a:buChar char="●"/>
+            </a:pPr>
+            <a:r>
+              <a:rPr lang="en"/>
+              <a:t>The best performing 6 cylinder by 1982, was the Oldsmobile Cutlass Ciera, with an MPG of 38.</a:t>
+            </a:r>
+            <a:endParaRPr/>
+          </a:p>
+        </p:txBody>
+      </p:sp>
+    </p:spTree>
+  </p:cSld>
+  <p:clrMapOvr>
+    <a:masterClrMapping/>
+  </p:clrMapOvr>
+</p:sld>
+</file>
+
+<file path=ppt/slides/slide13.xml><?xml version="1.0" encoding="utf-8"?>
+<p:sld xmlns:a="http://schemas.openxmlformats.org/drawingml/2006/main" xmlns:r="http://schemas.openxmlformats.org/officeDocument/2006/relationships" xmlns:mc="http://schemas.openxmlformats.org/markup-compatibility/2006" xmlns:mv="urn:schemas-microsoft-com:mac:vml" xmlns:p="http://schemas.openxmlformats.org/presentationml/2006/main" xmlns:c="http://schemas.openxmlformats.org/drawingml/2006/chart" xmlns:dgm="http://schemas.openxmlformats.org/drawingml/2006/diagram" xmlns:o="urn:schemas-microsoft-com:office:office" xmlns:v="urn:schemas-microsoft-com:vml" xmlns:pvml="urn:schemas-microsoft-com:office:powerpoint" xmlns:com="http://schemas.openxmlformats.org/drawingml/2006/compatibility" xmlns:p14="http://schemas.microsoft.com/office/powerpoint/2010/main" xmlns:p15="http://schemas.microsoft.com/office/powerpoint/2012/main" xmlns:ahyp="http://schemas.microsoft.com/office/drawing/2018/hyperlinkcolor">
+  <p:cSld>
+    <p:spTree>
+      <p:nvGrpSpPr>
+        <p:cNvPr id="128" name="Shape 128"/>
+        <p:cNvGrpSpPr/>
+        <p:nvPr/>
+      </p:nvGrpSpPr>
+      <p:grpSpPr>
+        <a:xfrm>
+          <a:off x="0" y="0"/>
+          <a:ext cx="0" cy="0"/>
+          <a:chOff x="0" y="0"/>
+          <a:chExt cx="0" cy="0"/>
+        </a:xfrm>
+      </p:grpSpPr>
+      <p:sp>
+        <p:nvSpPr>
+          <p:cNvPr id="129" name="Google Shape;129;p25"/>
+          <p:cNvSpPr txBox="1"/>
+          <p:nvPr>
+            <p:ph type="title"/>
+          </p:nvPr>
+        </p:nvSpPr>
+        <p:spPr>
+          <a:xfrm>
+            <a:off x="311700" y="445025"/>
+            <a:ext cx="8520600" cy="572700"/>
+          </a:xfrm>
+          <a:prstGeom prst="rect">
+            <a:avLst/>
+          </a:prstGeom>
+        </p:spPr>
+        <p:txBody>
+          <a:bodyPr anchorCtr="0" anchor="t" bIns="91425" lIns="91425" spcFirstLastPara="1" rIns="91425" wrap="square" tIns="91425">
+            <a:normAutofit fontScale="90000"/>
+          </a:bodyPr>
+          <a:lstStyle/>
+          <a:p>
+            <a:pPr indent="0" lvl="0" marL="0" rtl="0" algn="l">
+              <a:spcBef>
+                <a:spcPts val="0"/>
+              </a:spcBef>
+              <a:spcAft>
+                <a:spcPts val="0"/>
+              </a:spcAft>
+              <a:buNone/>
+            </a:pPr>
+            <a:r>
+              <a:rPr lang="en"/>
               <a:t>Moving Forward</a:t>
             </a:r>
             <a:endParaRPr/>
@@ -7512,7 +7722,7 @@
       </p:sp>
       <p:sp>
         <p:nvSpPr>
-          <p:cNvPr id="124" name="Google Shape;124;p24"/>
+          <p:cNvPr id="130" name="Google Shape;130;p25"/>
           <p:cNvSpPr txBox="1"/>
           <p:nvPr>
             <p:ph idx="1" type="body"/>
@@ -8355,9 +8565,102 @@
           <a:chExt cx="0" cy="0"/>
         </a:xfrm>
       </p:grpSpPr>
+      <p:sp>
+        <p:nvSpPr>
+          <p:cNvPr id="92" name="Google Shape;92;p19"/>
+          <p:cNvSpPr txBox="1"/>
+          <p:nvPr>
+            <p:ph type="title"/>
+          </p:nvPr>
+        </p:nvSpPr>
+        <p:spPr>
+          <a:xfrm>
+            <a:off x="514800" y="3470925"/>
+            <a:ext cx="8114400" cy="1439400"/>
+          </a:xfrm>
+          <a:prstGeom prst="rect">
+            <a:avLst/>
+          </a:prstGeom>
+        </p:spPr>
+        <p:txBody>
+          <a:bodyPr anchorCtr="0" anchor="b" bIns="91425" lIns="91425" spcFirstLastPara="1" rIns="91425" wrap="square" tIns="91425">
+            <a:normAutofit/>
+          </a:bodyPr>
+          <a:lstStyle/>
+          <a:p>
+            <a:pPr indent="0" lvl="0" marL="0" rtl="0" algn="ctr">
+              <a:spcBef>
+                <a:spcPts val="0"/>
+              </a:spcBef>
+              <a:spcAft>
+                <a:spcPts val="0"/>
+              </a:spcAft>
+              <a:buNone/>
+            </a:pPr>
+            <a:r>
+              <a:rPr lang="en" sz="4000"/>
+              <a:t>MPG v. Weight by Vehicle</a:t>
+            </a:r>
+            <a:endParaRPr sz="4000"/>
+          </a:p>
+        </p:txBody>
+      </p:sp>
       <p:pic>
         <p:nvPicPr>
-          <p:cNvPr id="92" name="Google Shape;92;p19"/>
+          <p:cNvPr id="93" name="Google Shape;93;p19"/>
+          <p:cNvPicPr preferRelativeResize="0"/>
+          <p:nvPr/>
+        </p:nvPicPr>
+        <p:blipFill>
+          <a:blip r:embed="rId3">
+            <a:alphaModFix/>
+          </a:blip>
+          <a:stretch>
+            <a:fillRect/>
+          </a:stretch>
+        </p:blipFill>
+        <p:spPr>
+          <a:xfrm>
+            <a:off x="1157825" y="223050"/>
+            <a:ext cx="6828350" cy="3445125"/>
+          </a:xfrm>
+          <a:prstGeom prst="rect">
+            <a:avLst/>
+          </a:prstGeom>
+          <a:noFill/>
+          <a:ln>
+            <a:noFill/>
+          </a:ln>
+        </p:spPr>
+      </p:pic>
+    </p:spTree>
+  </p:cSld>
+  <p:clrMapOvr>
+    <a:masterClrMapping/>
+  </p:clrMapOvr>
+</p:sld>
+</file>
+
+<file path=ppt/slides/slide8.xml><?xml version="1.0" encoding="utf-8"?>
+<p:sld xmlns:a="http://schemas.openxmlformats.org/drawingml/2006/main" xmlns:r="http://schemas.openxmlformats.org/officeDocument/2006/relationships" xmlns:mc="http://schemas.openxmlformats.org/markup-compatibility/2006" xmlns:mv="urn:schemas-microsoft-com:mac:vml" xmlns:p="http://schemas.openxmlformats.org/presentationml/2006/main" xmlns:c="http://schemas.openxmlformats.org/drawingml/2006/chart" xmlns:dgm="http://schemas.openxmlformats.org/drawingml/2006/diagram" xmlns:o="urn:schemas-microsoft-com:office:office" xmlns:v="urn:schemas-microsoft-com:vml" xmlns:pvml="urn:schemas-microsoft-com:office:powerpoint" xmlns:com="http://schemas.openxmlformats.org/drawingml/2006/compatibility" xmlns:p14="http://schemas.microsoft.com/office/powerpoint/2010/main" xmlns:p15="http://schemas.microsoft.com/office/powerpoint/2012/main" xmlns:ahyp="http://schemas.microsoft.com/office/drawing/2018/hyperlinkcolor">
+  <p:cSld>
+    <p:spTree>
+      <p:nvGrpSpPr>
+        <p:cNvPr id="97" name="Shape 97"/>
+        <p:cNvGrpSpPr/>
+        <p:nvPr/>
+      </p:nvGrpSpPr>
+      <p:grpSpPr>
+        <a:xfrm>
+          <a:off x="0" y="0"/>
+          <a:ext cx="0" cy="0"/>
+          <a:chOff x="0" y="0"/>
+          <a:chExt cx="0" cy="0"/>
+        </a:xfrm>
+      </p:grpSpPr>
+      <p:pic>
+        <p:nvPicPr>
+          <p:cNvPr id="98" name="Google Shape;98;p20"/>
           <p:cNvPicPr preferRelativeResize="0"/>
           <p:nvPr/>
         </p:nvPicPr>
@@ -8384,7 +8687,7 @@
       </p:pic>
       <p:sp>
         <p:nvSpPr>
-          <p:cNvPr id="93" name="Google Shape;93;p19"/>
+          <p:cNvPr id="99" name="Google Shape;99;p20"/>
           <p:cNvSpPr txBox="1"/>
           <p:nvPr>
             <p:ph idx="2" type="body"/>
@@ -8508,7 +8811,7 @@
       </p:sp>
       <p:sp>
         <p:nvSpPr>
-          <p:cNvPr id="94" name="Google Shape;94;p19"/>
+          <p:cNvPr id="100" name="Google Shape;100;p20"/>
           <p:cNvSpPr txBox="1"/>
           <p:nvPr>
             <p:ph type="title"/>
@@ -8554,12 +8857,12 @@
 </p:sld>
 </file>
 
-<file path=ppt/slides/slide8.xml><?xml version="1.0" encoding="utf-8"?>
+<file path=ppt/slides/slide9.xml><?xml version="1.0" encoding="utf-8"?>
 <p:sld xmlns:a="http://schemas.openxmlformats.org/drawingml/2006/main" xmlns:r="http://schemas.openxmlformats.org/officeDocument/2006/relationships" xmlns:mc="http://schemas.openxmlformats.org/markup-compatibility/2006" xmlns:mv="urn:schemas-microsoft-com:mac:vml" xmlns:p="http://schemas.openxmlformats.org/presentationml/2006/main" xmlns:c="http://schemas.openxmlformats.org/drawingml/2006/chart" xmlns:dgm="http://schemas.openxmlformats.org/drawingml/2006/diagram" xmlns:o="urn:schemas-microsoft-com:office:office" xmlns:v="urn:schemas-microsoft-com:vml" xmlns:pvml="urn:schemas-microsoft-com:office:powerpoint" xmlns:com="http://schemas.openxmlformats.org/drawingml/2006/compatibility" xmlns:p14="http://schemas.microsoft.com/office/powerpoint/2010/main" xmlns:p15="http://schemas.microsoft.com/office/powerpoint/2012/main" xmlns:ahyp="http://schemas.microsoft.com/office/drawing/2018/hyperlinkcolor">
   <p:cSld>
     <p:spTree>
       <p:nvGrpSpPr>
-        <p:cNvPr id="98" name="Shape 98"/>
+        <p:cNvPr id="104" name="Shape 104"/>
         <p:cNvGrpSpPr/>
         <p:nvPr/>
       </p:nvGrpSpPr>
@@ -8573,7 +8876,7 @@
       </p:grpSpPr>
       <p:sp>
         <p:nvSpPr>
-          <p:cNvPr id="99" name="Google Shape;99;p20"/>
+          <p:cNvPr id="105" name="Google Shape;105;p21"/>
           <p:cNvSpPr txBox="1"/>
           <p:nvPr>
             <p:ph type="title"/>
@@ -8613,7 +8916,7 @@
       </p:sp>
       <p:sp>
         <p:nvSpPr>
-          <p:cNvPr id="100" name="Google Shape;100;p20"/>
+          <p:cNvPr id="106" name="Google Shape;106;p21"/>
           <p:cNvSpPr txBox="1"/>
           <p:nvPr>
             <p:ph idx="1" type="body"/>
@@ -8737,7 +9040,7 @@
       </p:sp>
       <p:pic>
         <p:nvPicPr>
-          <p:cNvPr id="101" name="Google Shape;101;p20"/>
+          <p:cNvPr id="107" name="Google Shape;107;p21"/>
           <p:cNvPicPr preferRelativeResize="0"/>
           <p:nvPr/>
         </p:nvPicPr>
@@ -8753,99 +9056,6 @@
           <a:xfrm>
             <a:off x="4311600" y="1170125"/>
             <a:ext cx="4680001" cy="3279450"/>
-          </a:xfrm>
-          <a:prstGeom prst="rect">
-            <a:avLst/>
-          </a:prstGeom>
-          <a:noFill/>
-          <a:ln>
-            <a:noFill/>
-          </a:ln>
-        </p:spPr>
-      </p:pic>
-    </p:spTree>
-  </p:cSld>
-  <p:clrMapOvr>
-    <a:masterClrMapping/>
-  </p:clrMapOvr>
-</p:sld>
-</file>
-
-<file path=ppt/slides/slide9.xml><?xml version="1.0" encoding="utf-8"?>
-<p:sld xmlns:a="http://schemas.openxmlformats.org/drawingml/2006/main" xmlns:r="http://schemas.openxmlformats.org/officeDocument/2006/relationships" xmlns:mc="http://schemas.openxmlformats.org/markup-compatibility/2006" xmlns:mv="urn:schemas-microsoft-com:mac:vml" xmlns:p="http://schemas.openxmlformats.org/presentationml/2006/main" xmlns:c="http://schemas.openxmlformats.org/drawingml/2006/chart" xmlns:dgm="http://schemas.openxmlformats.org/drawingml/2006/diagram" xmlns:o="urn:schemas-microsoft-com:office:office" xmlns:v="urn:schemas-microsoft-com:vml" xmlns:pvml="urn:schemas-microsoft-com:office:powerpoint" xmlns:com="http://schemas.openxmlformats.org/drawingml/2006/compatibility" xmlns:p14="http://schemas.microsoft.com/office/powerpoint/2010/main" xmlns:p15="http://schemas.microsoft.com/office/powerpoint/2012/main" xmlns:ahyp="http://schemas.microsoft.com/office/drawing/2018/hyperlinkcolor">
-  <p:cSld>
-    <p:spTree>
-      <p:nvGrpSpPr>
-        <p:cNvPr id="105" name="Shape 105"/>
-        <p:cNvGrpSpPr/>
-        <p:nvPr/>
-      </p:nvGrpSpPr>
-      <p:grpSpPr>
-        <a:xfrm>
-          <a:off x="0" y="0"/>
-          <a:ext cx="0" cy="0"/>
-          <a:chOff x="0" y="0"/>
-          <a:chExt cx="0" cy="0"/>
-        </a:xfrm>
-      </p:grpSpPr>
-      <p:sp>
-        <p:nvSpPr>
-          <p:cNvPr id="106" name="Google Shape;106;p21"/>
-          <p:cNvSpPr txBox="1"/>
-          <p:nvPr>
-            <p:ph type="title"/>
-          </p:nvPr>
-        </p:nvSpPr>
-        <p:spPr>
-          <a:xfrm>
-            <a:off x="311700" y="3487050"/>
-            <a:ext cx="8114400" cy="1439400"/>
-          </a:xfrm>
-          <a:prstGeom prst="rect">
-            <a:avLst/>
-          </a:prstGeom>
-        </p:spPr>
-        <p:txBody>
-          <a:bodyPr anchorCtr="0" anchor="b" bIns="91425" lIns="91425" spcFirstLastPara="1" rIns="91425" wrap="square" tIns="91425">
-            <a:normAutofit/>
-          </a:bodyPr>
-          <a:lstStyle/>
-          <a:p>
-            <a:pPr indent="0" lvl="0" marL="0" rtl="0" algn="ctr">
-              <a:spcBef>
-                <a:spcPts val="0"/>
-              </a:spcBef>
-              <a:spcAft>
-                <a:spcPts val="0"/>
-              </a:spcAft>
-              <a:buNone/>
-            </a:pPr>
-            <a:r>
-              <a:rPr lang="en" sz="4000"/>
-              <a:t>Weight v. Acceleration</a:t>
-            </a:r>
-            <a:endParaRPr sz="4000"/>
-          </a:p>
-        </p:txBody>
-      </p:sp>
-      <p:pic>
-        <p:nvPicPr>
-          <p:cNvPr id="107" name="Google Shape;107;p21"/>
-          <p:cNvPicPr preferRelativeResize="0"/>
-          <p:nvPr/>
-        </p:nvPicPr>
-        <p:blipFill>
-          <a:blip r:embed="rId3">
-            <a:alphaModFix/>
-          </a:blip>
-          <a:stretch>
-            <a:fillRect/>
-          </a:stretch>
-        </p:blipFill>
-        <p:spPr>
-          <a:xfrm>
-            <a:off x="1463750" y="304800"/>
-            <a:ext cx="6216489" cy="3182250"/>
           </a:xfrm>
           <a:prstGeom prst="rect">
             <a:avLst/>

</xml_diff>